<commit_message>
Update Team 25 - Presentation.pptx
</commit_message>
<xml_diff>
--- a/Team 25 - Presentation.pptx
+++ b/Team 25 - Presentation.pptx
@@ -294,7 +294,7 @@
             <a:fld id="{276D79ED-3FA7-4EF8-964B-EB8BCFAB02F8}" type="datetimeFigureOut">
               <a:rPr lang="en-US" smtClean="0"/>
               <a:pPr/>
-              <a:t>1/3/2021</a:t>
+              <a:t>1/4/2021</a:t>
             </a:fld>
             <a:endParaRPr lang="en-US"/>
           </a:p>
@@ -489,7 +489,7 @@
           <a:p>
             <a:fld id="{276D79ED-3FA7-4EF8-964B-EB8BCFAB02F8}" type="datetimeFigureOut">
               <a:rPr lang="en-US" smtClean="0"/>
-              <a:t>1/3/2021</a:t>
+              <a:t>1/4/2021</a:t>
             </a:fld>
             <a:endParaRPr lang="en-US"/>
           </a:p>
@@ -735,7 +735,7 @@
           <a:p>
             <a:fld id="{276D79ED-3FA7-4EF8-964B-EB8BCFAB02F8}" type="datetimeFigureOut">
               <a:rPr lang="en-US" smtClean="0"/>
-              <a:t>1/3/2021</a:t>
+              <a:t>1/4/2021</a:t>
             </a:fld>
             <a:endParaRPr lang="en-US"/>
           </a:p>
@@ -964,7 +964,7 @@
           <a:p>
             <a:fld id="{276D79ED-3FA7-4EF8-964B-EB8BCFAB02F8}" type="datetimeFigureOut">
               <a:rPr lang="en-US" smtClean="0"/>
-              <a:t>1/3/2021</a:t>
+              <a:t>1/4/2021</a:t>
             </a:fld>
             <a:endParaRPr lang="en-US"/>
           </a:p>
@@ -1328,7 +1328,7 @@
           <a:p>
             <a:fld id="{276D79ED-3FA7-4EF8-964B-EB8BCFAB02F8}" type="datetimeFigureOut">
               <a:rPr lang="en-US" smtClean="0"/>
-              <a:t>1/3/2021</a:t>
+              <a:t>1/4/2021</a:t>
             </a:fld>
             <a:endParaRPr lang="en-US"/>
           </a:p>
@@ -1445,7 +1445,7 @@
           <a:p>
             <a:fld id="{276D79ED-3FA7-4EF8-964B-EB8BCFAB02F8}" type="datetimeFigureOut">
               <a:rPr lang="en-US" smtClean="0"/>
-              <a:t>1/3/2021</a:t>
+              <a:t>1/4/2021</a:t>
             </a:fld>
             <a:endParaRPr lang="en-US"/>
           </a:p>
@@ -1540,7 +1540,7 @@
           <a:p>
             <a:fld id="{276D79ED-3FA7-4EF8-964B-EB8BCFAB02F8}" type="datetimeFigureOut">
               <a:rPr lang="en-US" smtClean="0"/>
-              <a:t>1/3/2021</a:t>
+              <a:t>1/4/2021</a:t>
             </a:fld>
             <a:endParaRPr lang="en-US"/>
           </a:p>
@@ -1816,7 +1816,7 @@
           <a:p>
             <a:fld id="{276D79ED-3FA7-4EF8-964B-EB8BCFAB02F8}" type="datetimeFigureOut">
               <a:rPr lang="en-US" smtClean="0"/>
-              <a:t>1/3/2021</a:t>
+              <a:t>1/4/2021</a:t>
             </a:fld>
             <a:endParaRPr lang="en-US"/>
           </a:p>
@@ -2072,7 +2072,7 @@
           <a:p>
             <a:fld id="{276D79ED-3FA7-4EF8-964B-EB8BCFAB02F8}" type="datetimeFigureOut">
               <a:rPr lang="en-US" smtClean="0"/>
-              <a:t>1/3/2021</a:t>
+              <a:t>1/4/2021</a:t>
             </a:fld>
             <a:endParaRPr lang="en-US"/>
           </a:p>
@@ -2291,7 +2291,7 @@
             <a:fld id="{276D79ED-3FA7-4EF8-964B-EB8BCFAB02F8}" type="datetimeFigureOut">
               <a:rPr lang="en-US" smtClean="0"/>
               <a:pPr/>
-              <a:t>1/3/2021</a:t>
+              <a:t>1/4/2021</a:t>
             </a:fld>
             <a:endParaRPr lang="en-US"/>
           </a:p>
@@ -4035,12 +4035,14 @@
         </p:nvSpPr>
         <p:spPr>
           <a:xfrm>
-            <a:off x="838200" y="17463"/>
-            <a:ext cx="10253870" cy="896937"/>
-          </a:xfrm>
-        </p:spPr>
-        <p:txBody>
-          <a:bodyPr/>
+            <a:off x="304800" y="1709530"/>
+            <a:ext cx="5194851" cy="2385391"/>
+          </a:xfrm>
+        </p:spPr>
+        <p:txBody>
+          <a:bodyPr>
+            <a:normAutofit/>
+          </a:bodyPr>
           <a:lstStyle/>
           <a:p>
             <a:r>
@@ -4051,17 +4053,17 @@
                   </a:schemeClr>
                 </a:solidFill>
               </a:rPr>
-              <a:t>EER</a:t>
+              <a:t>Extended Entity-Relationship</a:t>
             </a:r>
           </a:p>
         </p:txBody>
       </p:sp>
       <p:pic>
         <p:nvPicPr>
-          <p:cNvPr id="9" name="Content Placeholder 8" descr="Diagram&#10;&#10;Description automatically generated">
+          <p:cNvPr id="6" name="Content Placeholder 5">
             <a:extLst>
               <a:ext uri="{FF2B5EF4-FFF2-40B4-BE49-F238E27FC236}">
-                <a16:creationId xmlns:a16="http://schemas.microsoft.com/office/drawing/2014/main" id="{4F1427CF-76C6-4F24-8F68-C311D01DA83E}"/>
+                <a16:creationId xmlns:a16="http://schemas.microsoft.com/office/drawing/2014/main" id="{26E58472-7833-4A97-AA31-446F14260157}"/>
               </a:ext>
             </a:extLst>
           </p:cNvPr>
@@ -4086,8 +4088,8 @@
         </p:blipFill>
         <p:spPr>
           <a:xfrm>
-            <a:off x="2491409" y="775327"/>
-            <a:ext cx="7354956" cy="6082673"/>
+            <a:off x="5830956" y="52482"/>
+            <a:ext cx="5685183" cy="6711650"/>
           </a:xfrm>
         </p:spPr>
       </p:pic>
@@ -5490,18 +5492,18 @@
 </file>
 
 <file path=customXml/item2.xml><?xml version="1.0" encoding="utf-8"?>
+<p:properties xmlns:p="http://schemas.microsoft.com/office/2006/metadata/properties" xmlns:xsi="http://www.w3.org/2001/XMLSchema-instance" xmlns:pc="http://schemas.microsoft.com/office/infopath/2007/PartnerControls">
+  <documentManagement/>
+</p:properties>
+</file>
+
+<file path=customXml/item3.xml><?xml version="1.0" encoding="utf-8"?>
 <?mso-contentType ?>
 <FormTemplates xmlns="http://schemas.microsoft.com/sharepoint/v3/contenttype/forms">
   <Display>DocumentLibraryForm</Display>
   <Edit>DocumentLibraryForm</Edit>
   <New>DocumentLibraryForm</New>
 </FormTemplates>
-</file>
-
-<file path=customXml/item3.xml><?xml version="1.0" encoding="utf-8"?>
-<p:properties xmlns:p="http://schemas.microsoft.com/office/2006/metadata/properties" xmlns:xsi="http://www.w3.org/2001/XMLSchema-instance" xmlns:pc="http://schemas.microsoft.com/office/infopath/2007/PartnerControls">
-  <documentManagement/>
-</p:properties>
 </file>
 
 <file path=customXml/itemProps1.xml><?xml version="1.0" encoding="utf-8"?>
@@ -5524,14 +5526,6 @@
 </file>
 
 <file path=customXml/itemProps2.xml><?xml version="1.0" encoding="utf-8"?>
-<ds:datastoreItem xmlns:ds="http://schemas.openxmlformats.org/officeDocument/2006/customXml" ds:itemID="{1434393C-6F42-44A7-B99A-A1FAE32562F6}">
-  <ds:schemaRefs>
-    <ds:schemaRef ds:uri="http://schemas.microsoft.com/sharepoint/v3/contenttype/forms"/>
-  </ds:schemaRefs>
-</ds:datastoreItem>
-</file>
-
-<file path=customXml/itemProps3.xml><?xml version="1.0" encoding="utf-8"?>
 <ds:datastoreItem xmlns:ds="http://schemas.openxmlformats.org/officeDocument/2006/customXml" ds:itemID="{3AC72318-ED93-488E-B802-F5483FEEDD7A}">
   <ds:schemaRefs>
     <ds:schemaRef ds:uri="http://purl.org/dc/terms/"/>
@@ -5546,4 +5540,12 @@
     <ds:schemaRef ds:uri="4492025a-3c6d-4369-ae46-502158ea559c"/>
   </ds:schemaRefs>
 </ds:datastoreItem>
+</file>
+
+<file path=customXml/itemProps3.xml><?xml version="1.0" encoding="utf-8"?>
+<ds:datastoreItem xmlns:ds="http://schemas.openxmlformats.org/officeDocument/2006/customXml" ds:itemID="{1434393C-6F42-44A7-B99A-A1FAE32562F6}">
+  <ds:schemaRefs>
+    <ds:schemaRef ds:uri="http://schemas.microsoft.com/sharepoint/v3/contenttype/forms"/>
+  </ds:schemaRefs>
+</ds:datastoreItem>
 </file>
</xml_diff>